<commit_message>
update slides (fix typos errors)
</commit_message>
<xml_diff>
--- a/lecture-slides/aima/ai-chapter6-adversarial-search-and-game-playing-aima.pptx
+++ b/lecture-slides/aima/ai-chapter6-adversarial-search-and-game-playing-aima.pptx
@@ -30911,10 +30911,10 @@
               <a:buNone/>
             </a:pPr>
             <a:r>
-              <a:rPr lang="en-US"/>
+              <a:rPr lang="en-US" sz="4800"/>
               <a:t>Properties of minmax</a:t>
             </a:r>
-            <a:endParaRPr/>
+            <a:endParaRPr sz="4800"/>
           </a:p>
         </p:txBody>
       </p:sp>
@@ -31000,7 +31000,11 @@
             </a:pPr>
             <a:r>
               <a:rPr lang="en-US" sz="3000"/>
-              <a:t>Optimal? Yes, if the tree is finite </a:t>
+              <a:t>Complete</a:t>
+            </a:r>
+            <a:r>
+              <a:rPr lang="en-US" sz="3000"/>
+              <a:t>? Yes, if the tree is finite </a:t>
             </a:r>
             <a:endParaRPr sz="3000"/>
           </a:p>
@@ -31297,7 +31301,7 @@
             <a:tbl>
               <a:tblPr>
                 <a:noFill/>
-                <a:tableStyleId>{10FF3763-1474-498B-A5BD-1153E8CDBB43}</a:tableStyleId>
+                <a:tableStyleId>{188D4EBB-20C2-4782-AF6A-04AC072D1A28}</a:tableStyleId>
               </a:tblPr>
               <a:tblGrid>
                 <a:gridCol w="2133600"/>
@@ -41853,7 +41857,7 @@
             <a:tbl>
               <a:tblPr>
                 <a:noFill/>
-                <a:tableStyleId>{10FF3763-1474-498B-A5BD-1153E8CDBB43}</a:tableStyleId>
+                <a:tableStyleId>{188D4EBB-20C2-4782-AF6A-04AC072D1A28}</a:tableStyleId>
               </a:tblPr>
               <a:tblGrid>
                 <a:gridCol w="3577275"/>

</xml_diff>